<commit_message>
updated overview slides + replacement slide 26 from Marcus inserted into ECO
</commit_message>
<xml_diff>
--- a/docs/presentations/OBI tutorial July 2011 ICBO/OBI-ICBO_ECO-talk_2.pptx
+++ b/docs/presentations/OBI tutorial July 2011 ICBO/OBI-ICBO_ECO-talk_2.pptx
@@ -33,7 +33,7 @@
     <p:sldId id="345" r:id="rId24"/>
     <p:sldId id="296" r:id="rId25"/>
     <p:sldId id="344" r:id="rId26"/>
-    <p:sldId id="335" r:id="rId27"/>
+    <p:sldId id="347" r:id="rId27"/>
     <p:sldId id="328" r:id="rId28"/>
     <p:sldId id="331" r:id="rId29"/>
     <p:sldId id="329" r:id="rId30"/>
@@ -220,7 +220,8 @@
           <a:p>
             <a:fld id="{2437FF7E-9190-2441-AFBA-59E3A0407F41}" type="datetimeFigureOut">
               <a:rPr lang="en-US" smtClean="0"/>
-              <a:t>7/25/11</a:t>
+              <a:pPr/>
+              <a:t>7/26/2011</a:t>
             </a:fld>
             <a:endParaRPr lang="en-US"/>
           </a:p>
@@ -379,6 +380,7 @@
           <a:p>
             <a:fld id="{3BB8A35F-897A-6342-B883-C93FE82439D2}" type="slidenum">
               <a:rPr lang="en-US" smtClean="0"/>
+              <a:pPr/>
               <a:t>‹#›</a:t>
             </a:fld>
             <a:endParaRPr lang="en-US"/>
@@ -388,7 +390,7 @@
     </p:spTree>
     <p:extLst>
       <p:ext uri="{BB962C8B-B14F-4D97-AF65-F5344CB8AC3E}">
-        <p14:creationId xmlns:p14="http://schemas.microsoft.com/office/powerpoint/2010/main" val="79469786"/>
+        <p14:creationId xmlns:p14="http://schemas.microsoft.com/office/powerpoint/2010/main" xmlns="" val="79469786"/>
       </p:ext>
     </p:extLst>
   </p:cSld>
@@ -924,7 +926,8 @@
           <a:p>
             <a:fld id="{2C1E9CF4-4D50-2C4D-A475-D413525D968E}" type="datetimeFigureOut">
               <a:rPr lang="en-US" smtClean="0"/>
-              <a:t>7/25/11</a:t>
+              <a:pPr/>
+              <a:t>7/26/2011</a:t>
             </a:fld>
             <a:endParaRPr lang="en-US"/>
           </a:p>
@@ -1536,7 +1539,8 @@
           <a:p>
             <a:fld id="{2C1E9CF4-4D50-2C4D-A475-D413525D968E}" type="datetimeFigureOut">
               <a:rPr lang="en-US" smtClean="0"/>
-              <a:t>7/25/11</a:t>
+              <a:pPr/>
+              <a:t>7/26/2011</a:t>
             </a:fld>
             <a:endParaRPr lang="en-US"/>
           </a:p>
@@ -1578,6 +1582,7 @@
           <a:p>
             <a:fld id="{2FF6207D-45FE-BB4C-82D1-7DFCC4A5D4DF}" type="slidenum">
               <a:rPr lang="en-US" smtClean="0"/>
+              <a:pPr/>
               <a:t>‹#›</a:t>
             </a:fld>
             <a:endParaRPr lang="en-US"/>
@@ -2108,7 +2113,8 @@
           <a:p>
             <a:fld id="{2C1E9CF4-4D50-2C4D-A475-D413525D968E}" type="datetimeFigureOut">
               <a:rPr lang="en-US" smtClean="0"/>
-              <a:t>7/25/11</a:t>
+              <a:pPr/>
+              <a:t>7/26/2011</a:t>
             </a:fld>
             <a:endParaRPr lang="en-US"/>
           </a:p>
@@ -2150,6 +2156,7 @@
           <a:p>
             <a:fld id="{2FF6207D-45FE-BB4C-82D1-7DFCC4A5D4DF}" type="slidenum">
               <a:rPr lang="en-US" smtClean="0"/>
+              <a:pPr/>
               <a:t>‹#›</a:t>
             </a:fld>
             <a:endParaRPr lang="en-US"/>
@@ -2642,7 +2649,8 @@
           <a:p>
             <a:fld id="{2C1E9CF4-4D50-2C4D-A475-D413525D968E}" type="datetimeFigureOut">
               <a:rPr lang="en-US" smtClean="0"/>
-              <a:t>7/25/11</a:t>
+              <a:pPr/>
+              <a:t>7/26/2011</a:t>
             </a:fld>
             <a:endParaRPr lang="en-US"/>
           </a:p>
@@ -2684,6 +2692,7 @@
           <a:p>
             <a:fld id="{2FF6207D-45FE-BB4C-82D1-7DFCC4A5D4DF}" type="slidenum">
               <a:rPr lang="en-US" smtClean="0"/>
+              <a:pPr/>
               <a:t>‹#›</a:t>
             </a:fld>
             <a:endParaRPr lang="en-US"/>
@@ -3044,7 +3053,8 @@
           <a:p>
             <a:fld id="{2C1E9CF4-4D50-2C4D-A475-D413525D968E}" type="datetimeFigureOut">
               <a:rPr lang="en-US" smtClean="0"/>
-              <a:t>7/25/11</a:t>
+              <a:pPr/>
+              <a:t>7/26/2011</a:t>
             </a:fld>
             <a:endParaRPr lang="en-US"/>
           </a:p>
@@ -3086,6 +3096,7 @@
           <a:p>
             <a:fld id="{2FF6207D-45FE-BB4C-82D1-7DFCC4A5D4DF}" type="slidenum">
               <a:rPr lang="en-US" smtClean="0"/>
+              <a:pPr/>
               <a:t>‹#›</a:t>
             </a:fld>
             <a:endParaRPr lang="en-US"/>
@@ -3477,7 +3488,8 @@
           <a:p>
             <a:fld id="{2C1E9CF4-4D50-2C4D-A475-D413525D968E}" type="datetimeFigureOut">
               <a:rPr lang="en-US" smtClean="0"/>
-              <a:t>7/25/11</a:t>
+              <a:pPr/>
+              <a:t>7/26/2011</a:t>
             </a:fld>
             <a:endParaRPr lang="en-US"/>
           </a:p>
@@ -3519,6 +3531,7 @@
           <a:p>
             <a:fld id="{2FF6207D-45FE-BB4C-82D1-7DFCC4A5D4DF}" type="slidenum">
               <a:rPr lang="en-US" smtClean="0"/>
+              <a:pPr/>
               <a:t>‹#›</a:t>
             </a:fld>
             <a:endParaRPr lang="en-US"/>
@@ -3879,7 +3892,8 @@
           <a:p>
             <a:fld id="{2C1E9CF4-4D50-2C4D-A475-D413525D968E}" type="datetimeFigureOut">
               <a:rPr lang="en-US" smtClean="0"/>
-              <a:t>7/25/11</a:t>
+              <a:pPr/>
+              <a:t>7/26/2011</a:t>
             </a:fld>
             <a:endParaRPr lang="en-US"/>
           </a:p>
@@ -3921,6 +3935,7 @@
           <a:p>
             <a:fld id="{2FF6207D-45FE-BB4C-82D1-7DFCC4A5D4DF}" type="slidenum">
               <a:rPr lang="en-US" smtClean="0"/>
+              <a:pPr/>
               <a:t>‹#›</a:t>
             </a:fld>
             <a:endParaRPr lang="en-US"/>
@@ -4353,7 +4368,8 @@
           <a:p>
             <a:fld id="{2C1E9CF4-4D50-2C4D-A475-D413525D968E}" type="datetimeFigureOut">
               <a:rPr lang="en-US" smtClean="0"/>
-              <a:t>7/25/11</a:t>
+              <a:pPr/>
+              <a:t>7/26/2011</a:t>
             </a:fld>
             <a:endParaRPr lang="en-US"/>
           </a:p>
@@ -4804,7 +4820,7 @@
             <a:fld id="{4A9E7B99-7C3F-4BC3-B7B8-7E1F8C620B24}" type="datetime1">
               <a:rPr lang="en-US" smtClean="0"/>
               <a:pPr/>
-              <a:t>7/25/11</a:t>
+              <a:t>7/26/2011</a:t>
             </a:fld>
             <a:endParaRPr lang="en-US"/>
           </a:p>
@@ -5330,7 +5346,8 @@
           <a:p>
             <a:fld id="{2C1E9CF4-4D50-2C4D-A475-D413525D968E}" type="datetimeFigureOut">
               <a:rPr lang="en-US" smtClean="0"/>
-              <a:t>7/25/11</a:t>
+              <a:pPr/>
+              <a:t>7/26/2011</a:t>
             </a:fld>
             <a:endParaRPr lang="en-US"/>
           </a:p>
@@ -5372,6 +5389,7 @@
           <a:p>
             <a:fld id="{2FF6207D-45FE-BB4C-82D1-7DFCC4A5D4DF}" type="slidenum">
               <a:rPr lang="en-US" smtClean="0"/>
+              <a:pPr/>
               <a:t>‹#›</a:t>
             </a:fld>
             <a:endParaRPr lang="en-US"/>
@@ -6050,7 +6068,8 @@
           <a:p>
             <a:fld id="{2C1E9CF4-4D50-2C4D-A475-D413525D968E}" type="datetimeFigureOut">
               <a:rPr lang="en-US" smtClean="0"/>
-              <a:t>7/25/11</a:t>
+              <a:pPr/>
+              <a:t>7/26/2011</a:t>
             </a:fld>
             <a:endParaRPr lang="en-US"/>
           </a:p>
@@ -6092,6 +6111,7 @@
           <a:p>
             <a:fld id="{2FF6207D-45FE-BB4C-82D1-7DFCC4A5D4DF}" type="slidenum">
               <a:rPr lang="en-US" smtClean="0"/>
+              <a:pPr/>
               <a:t>‹#›</a:t>
             </a:fld>
             <a:endParaRPr lang="en-US"/>
@@ -6396,7 +6416,8 @@
           <a:p>
             <a:fld id="{2C1E9CF4-4D50-2C4D-A475-D413525D968E}" type="datetimeFigureOut">
               <a:rPr lang="en-US" smtClean="0"/>
-              <a:t>7/25/11</a:t>
+              <a:pPr/>
+              <a:t>7/26/2011</a:t>
             </a:fld>
             <a:endParaRPr lang="en-US"/>
           </a:p>
@@ -6438,6 +6459,7 @@
           <a:p>
             <a:fld id="{2FF6207D-45FE-BB4C-82D1-7DFCC4A5D4DF}" type="slidenum">
               <a:rPr lang="en-US" smtClean="0"/>
+              <a:pPr/>
               <a:t>‹#›</a:t>
             </a:fld>
             <a:endParaRPr lang="en-US"/>
@@ -6665,7 +6687,8 @@
           <a:p>
             <a:fld id="{2C1E9CF4-4D50-2C4D-A475-D413525D968E}" type="datetimeFigureOut">
               <a:rPr lang="en-US" smtClean="0"/>
-              <a:t>7/25/11</a:t>
+              <a:pPr/>
+              <a:t>7/26/2011</a:t>
             </a:fld>
             <a:endParaRPr lang="en-US"/>
           </a:p>
@@ -6707,6 +6730,7 @@
           <a:p>
             <a:fld id="{2FF6207D-45FE-BB4C-82D1-7DFCC4A5D4DF}" type="slidenum">
               <a:rPr lang="en-US" smtClean="0"/>
+              <a:pPr/>
               <a:t>‹#›</a:t>
             </a:fld>
             <a:endParaRPr lang="en-US"/>
@@ -7222,7 +7246,8 @@
           <a:p>
             <a:fld id="{2C1E9CF4-4D50-2C4D-A475-D413525D968E}" type="datetimeFigureOut">
               <a:rPr lang="en-US" smtClean="0"/>
-              <a:t>7/25/11</a:t>
+              <a:pPr/>
+              <a:t>7/26/2011</a:t>
             </a:fld>
             <a:endParaRPr lang="en-US"/>
           </a:p>
@@ -7264,6 +7289,7 @@
           <a:p>
             <a:fld id="{2FF6207D-45FE-BB4C-82D1-7DFCC4A5D4DF}" type="slidenum">
               <a:rPr lang="en-US" smtClean="0"/>
+              <a:pPr/>
               <a:t>‹#›</a:t>
             </a:fld>
             <a:endParaRPr lang="en-US"/>
@@ -7432,7 +7458,8 @@
           <a:p>
             <a:fld id="{2C1E9CF4-4D50-2C4D-A475-D413525D968E}" type="datetimeFigureOut">
               <a:rPr lang="en-US" smtClean="0"/>
-              <a:t>7/25/11</a:t>
+              <a:pPr/>
+              <a:t>7/26/2011</a:t>
             </a:fld>
             <a:endParaRPr lang="en-US"/>
           </a:p>
@@ -7518,6 +7545,7 @@
           <a:p>
             <a:fld id="{2FF6207D-45FE-BB4C-82D1-7DFCC4A5D4DF}" type="slidenum">
               <a:rPr lang="en-US" smtClean="0"/>
+              <a:pPr/>
               <a:t>‹#›</a:t>
             </a:fld>
             <a:endParaRPr lang="en-US"/>
@@ -7964,7 +7992,7 @@
     </p:spTree>
     <p:extLst>
       <p:ext uri="{BB962C8B-B14F-4D97-AF65-F5344CB8AC3E}">
-        <p14:creationId xmlns:p14="http://schemas.microsoft.com/office/powerpoint/2010/main" val="3480261321"/>
+        <p14:creationId xmlns:p14="http://schemas.microsoft.com/office/powerpoint/2010/main" xmlns="" val="3480261321"/>
       </p:ext>
     </p:extLst>
   </p:cSld>
@@ -8183,7 +8211,7 @@
     </p:spTree>
     <p:extLst>
       <p:ext uri="{BB962C8B-B14F-4D97-AF65-F5344CB8AC3E}">
-        <p14:creationId xmlns:p14="http://schemas.microsoft.com/office/powerpoint/2010/main" val="2055537179"/>
+        <p14:creationId xmlns:p14="http://schemas.microsoft.com/office/powerpoint/2010/main" xmlns="" val="2055537179"/>
       </p:ext>
     </p:extLst>
   </p:cSld>
@@ -8272,7 +8300,7 @@
     </p:spTree>
     <p:extLst>
       <p:ext uri="{BB962C8B-B14F-4D97-AF65-F5344CB8AC3E}">
-        <p14:creationId xmlns:p14="http://schemas.microsoft.com/office/powerpoint/2010/main" val="3613411001"/>
+        <p14:creationId xmlns:p14="http://schemas.microsoft.com/office/powerpoint/2010/main" xmlns="" val="3613411001"/>
       </p:ext>
     </p:extLst>
   </p:cSld>
@@ -9412,7 +9440,7 @@
     </p:spTree>
     <p:extLst>
       <p:ext uri="{BB962C8B-B14F-4D97-AF65-F5344CB8AC3E}">
-        <p14:creationId xmlns:p14="http://schemas.microsoft.com/office/powerpoint/2010/main" val="2804946900"/>
+        <p14:creationId xmlns:p14="http://schemas.microsoft.com/office/powerpoint/2010/main" xmlns="" val="2804946900"/>
       </p:ext>
     </p:extLst>
   </p:cSld>
@@ -9849,7 +9877,7 @@
   <p:timing>
     <p:tnLst>
       <p:par>
-        <p:cTn xmlns:p14="http://schemas.microsoft.com/office/powerpoint/2010/main" id="1" dur="indefinite" restart="never" nodeType="tmRoot"/>
+        <p:cTn id="1" dur="indefinite" restart="never" nodeType="tmRoot"/>
       </p:par>
     </p:tnLst>
   </p:timing>
@@ -10299,7 +10327,7 @@
     </p:spTree>
     <p:extLst>
       <p:ext uri="{BB962C8B-B14F-4D97-AF65-F5344CB8AC3E}">
-        <p14:creationId xmlns:p14="http://schemas.microsoft.com/office/powerpoint/2010/main" val="3499274986"/>
+        <p14:creationId xmlns:p14="http://schemas.microsoft.com/office/powerpoint/2010/main" xmlns="" val="3499274986"/>
       </p:ext>
     </p:extLst>
   </p:cSld>
@@ -10462,7 +10490,7 @@
     </p:spTree>
     <p:extLst>
       <p:ext uri="{BB962C8B-B14F-4D97-AF65-F5344CB8AC3E}">
-        <p14:creationId xmlns:p14="http://schemas.microsoft.com/office/powerpoint/2010/main" val="2236247903"/>
+        <p14:creationId xmlns:p14="http://schemas.microsoft.com/office/powerpoint/2010/main" xmlns="" val="2236247903"/>
       </p:ext>
     </p:extLst>
   </p:cSld>
@@ -10472,7 +10500,7 @@
   <p:timing>
     <p:tnLst>
       <p:par>
-        <p:cTn xmlns:p14="http://schemas.microsoft.com/office/powerpoint/2010/main" id="1" dur="indefinite" restart="never" nodeType="tmRoot"/>
+        <p:cTn id="1" dur="indefinite" restart="never" nodeType="tmRoot"/>
       </p:par>
     </p:tnLst>
   </p:timing>
@@ -10556,7 +10584,7 @@
           <a:blip r:embed="rId2">
             <a:extLst>
               <a:ext uri="{28A0092B-C50C-407E-A947-70E740481C1C}">
-                <a14:useLocalDpi xmlns:a14="http://schemas.microsoft.com/office/drawing/2010/main" val="0"/>
+                <a14:useLocalDpi xmlns:a14="http://schemas.microsoft.com/office/drawing/2010/main" xmlns="" val="0"/>
               </a:ext>
             </a:extLst>
           </a:blip>
@@ -10910,7 +10938,7 @@
     </p:spTree>
     <p:extLst>
       <p:ext uri="{BB962C8B-B14F-4D97-AF65-F5344CB8AC3E}">
-        <p14:creationId xmlns:p14="http://schemas.microsoft.com/office/powerpoint/2010/main" val="1775960009"/>
+        <p14:creationId xmlns:p14="http://schemas.microsoft.com/office/powerpoint/2010/main" xmlns="" val="1775960009"/>
       </p:ext>
     </p:extLst>
   </p:cSld>
@@ -10920,7 +10948,7 @@
   <p:timing>
     <p:tnLst>
       <p:par>
-        <p:cTn xmlns:p14="http://schemas.microsoft.com/office/powerpoint/2010/main" id="1" dur="indefinite" restart="never" nodeType="tmRoot"/>
+        <p:cTn id="1" dur="indefinite" restart="never" nodeType="tmRoot"/>
       </p:par>
     </p:tnLst>
   </p:timing>
@@ -11575,7 +11603,7 @@
     </p:spTree>
     <p:extLst>
       <p:ext uri="{BB962C8B-B14F-4D97-AF65-F5344CB8AC3E}">
-        <p14:creationId xmlns:p14="http://schemas.microsoft.com/office/powerpoint/2010/main" val="1961932924"/>
+        <p14:creationId xmlns:p14="http://schemas.microsoft.com/office/powerpoint/2010/main" xmlns="" val="1961932924"/>
       </p:ext>
     </p:extLst>
   </p:cSld>
@@ -11690,7 +11718,7 @@
     </p:spTree>
     <p:extLst>
       <p:ext uri="{BB962C8B-B14F-4D97-AF65-F5344CB8AC3E}">
-        <p14:creationId xmlns:p14="http://schemas.microsoft.com/office/powerpoint/2010/main" val="1631178003"/>
+        <p14:creationId xmlns:p14="http://schemas.microsoft.com/office/powerpoint/2010/main" xmlns="" val="1631178003"/>
       </p:ext>
     </p:extLst>
   </p:cSld>
@@ -12091,7 +12119,7 @@
     </p:spTree>
     <p:extLst>
       <p:ext uri="{BB962C8B-B14F-4D97-AF65-F5344CB8AC3E}">
-        <p14:creationId xmlns:p14="http://schemas.microsoft.com/office/powerpoint/2010/main" val="1179400684"/>
+        <p14:creationId xmlns:p14="http://schemas.microsoft.com/office/powerpoint/2010/main" xmlns="" val="1179400684"/>
       </p:ext>
     </p:extLst>
   </p:cSld>
@@ -12176,7 +12204,6 @@
               <a:rPr lang="en-US" dirty="0" smtClean="0"/>
               <a:t>Visualizing the ontology</a:t>
             </a:r>
-            <a:endParaRPr lang="en-US" dirty="0" smtClean="0"/>
           </a:p>
           <a:p>
             <a:pPr lvl="1"/>
@@ -12242,11 +12269,7 @@
           <a:p>
             <a:r>
               <a:rPr lang="en-US" dirty="0" smtClean="0"/>
-              <a:t>Examples of </a:t>
-            </a:r>
-            <a:r>
-              <a:rPr lang="en-US" dirty="0" smtClean="0"/>
-              <a:t>an initial mapping </a:t>
+              <a:t>Examples of an initial mapping </a:t>
             </a:r>
             <a:r>
               <a:rPr lang="en-US" dirty="0"/>
@@ -12254,15 +12277,7 @@
             </a:r>
             <a:r>
               <a:rPr lang="en-US" dirty="0" smtClean="0"/>
-              <a:t>an </a:t>
-            </a:r>
-            <a:r>
-              <a:rPr lang="en-US" dirty="0" smtClean="0"/>
-              <a:t>ontology term </a:t>
-            </a:r>
-            <a:r>
-              <a:rPr lang="en-US" dirty="0" smtClean="0"/>
-              <a:t>to OBI</a:t>
+              <a:t>an ontology term to OBI</a:t>
             </a:r>
           </a:p>
         </p:txBody>
@@ -12299,11 +12314,7 @@
             </a:r>
             <a:r>
               <a:rPr lang="en-US" sz="1600" b="1" i="1" dirty="0" smtClean="0"/>
-              <a:t>the </a:t>
-            </a:r>
-            <a:r>
-              <a:rPr lang="en-US" sz="1600" b="1" i="1" dirty="0" smtClean="0"/>
-              <a:t>caveats </a:t>
+              <a:t>the caveats </a:t>
             </a:r>
             <a:r>
               <a:rPr lang="en-US" sz="1600" b="1" i="1" dirty="0"/>
@@ -12357,7 +12368,7 @@
     </p:spTree>
     <p:extLst>
       <p:ext uri="{BB962C8B-B14F-4D97-AF65-F5344CB8AC3E}">
-        <p14:creationId xmlns:p14="http://schemas.microsoft.com/office/powerpoint/2010/main" val="911416390"/>
+        <p14:creationId xmlns:p14="http://schemas.microsoft.com/office/powerpoint/2010/main" xmlns="" val="911416390"/>
       </p:ext>
     </p:extLst>
   </p:cSld>
@@ -12858,7 +12869,7 @@
     </p:spTree>
     <p:extLst>
       <p:ext uri="{BB962C8B-B14F-4D97-AF65-F5344CB8AC3E}">
-        <p14:creationId xmlns:p14="http://schemas.microsoft.com/office/powerpoint/2010/main" val="3225302304"/>
+        <p14:creationId xmlns:p14="http://schemas.microsoft.com/office/powerpoint/2010/main" xmlns="" val="3225302304"/>
       </p:ext>
     </p:extLst>
   </p:cSld>
@@ -12904,15 +12915,7 @@
           <a:p>
             <a:r>
               <a:rPr lang="en-US" dirty="0" smtClean="0"/>
-              <a:t>Once again, </a:t>
-            </a:r>
-            <a:r>
-              <a:rPr lang="en-US" dirty="0" smtClean="0"/>
-              <a:t>what </a:t>
-            </a:r>
-            <a:r>
-              <a:rPr lang="en-US" dirty="0" smtClean="0"/>
-              <a:t>is </a:t>
+              <a:t>Once again, what is </a:t>
             </a:r>
             <a:r>
               <a:rPr lang="en-US" i="1" dirty="0" smtClean="0"/>
@@ -13011,35 +13014,7 @@
             </a:pPr>
             <a:r>
               <a:rPr lang="en-US" dirty="0" smtClean="0"/>
-              <a:t>So, in ECO, perhaps we should opt to </a:t>
-            </a:r>
-            <a:r>
-              <a:rPr lang="en-US" dirty="0" smtClean="0"/>
-              <a:t>name things </a:t>
-            </a:r>
-            <a:r>
-              <a:rPr lang="en-US" dirty="0" smtClean="0"/>
-              <a:t>in terms of the </a:t>
-            </a:r>
-            <a:r>
-              <a:rPr lang="en-US" dirty="0" smtClean="0"/>
-              <a:t>process </a:t>
-            </a:r>
-            <a:r>
-              <a:rPr lang="en-US" dirty="0" smtClean="0"/>
-              <a:t>that </a:t>
-            </a:r>
-            <a:r>
-              <a:rPr lang="en-US" dirty="0" smtClean="0"/>
-              <a:t>generates </a:t>
-            </a:r>
-            <a:r>
-              <a:rPr lang="en-US" dirty="0" smtClean="0"/>
-              <a:t>the </a:t>
-            </a:r>
-            <a:r>
-              <a:rPr lang="en-US" dirty="0" smtClean="0"/>
-              <a:t>data?</a:t>
+              <a:t>So, in ECO, perhaps we should opt to name things in terms of the process that generates the data?</a:t>
             </a:r>
             <a:endParaRPr lang="en-US" dirty="0"/>
           </a:p>
@@ -13073,15 +13048,7 @@
                   <a:srgbClr val="FF0000"/>
                 </a:solidFill>
               </a:rPr>
-              <a:t>phylogenetic </a:t>
-            </a:r>
-            <a:r>
-              <a:rPr lang="en-US" i="1" dirty="0" smtClean="0">
-                <a:solidFill>
-                  <a:srgbClr val="FF0000"/>
-                </a:solidFill>
-              </a:rPr>
-              <a:t>analysis</a:t>
+              <a:t>phylogenetic analysis</a:t>
             </a:r>
             <a:endParaRPr lang="en-US" i="1" dirty="0">
               <a:solidFill>
@@ -13288,7 +13255,7 @@
     </p:spTree>
     <p:extLst>
       <p:ext uri="{BB962C8B-B14F-4D97-AF65-F5344CB8AC3E}">
-        <p14:creationId xmlns:p14="http://schemas.microsoft.com/office/powerpoint/2010/main" val="600509193"/>
+        <p14:creationId xmlns:p14="http://schemas.microsoft.com/office/powerpoint/2010/main" xmlns="" val="600509193"/>
       </p:ext>
     </p:extLst>
   </p:cSld>
@@ -13389,7 +13356,7 @@
     </p:spTree>
     <p:extLst>
       <p:ext uri="{BB962C8B-B14F-4D97-AF65-F5344CB8AC3E}">
-        <p14:creationId xmlns:p14="http://schemas.microsoft.com/office/powerpoint/2010/main" val="4151588210"/>
+        <p14:creationId xmlns:p14="http://schemas.microsoft.com/office/powerpoint/2010/main" xmlns="" val="4151588210"/>
       </p:ext>
     </p:extLst>
   </p:cSld>
@@ -13547,7 +13514,7 @@
     </p:spTree>
     <p:extLst>
       <p:ext uri="{BB962C8B-B14F-4D97-AF65-F5344CB8AC3E}">
-        <p14:creationId xmlns:p14="http://schemas.microsoft.com/office/powerpoint/2010/main" val="2372570"/>
+        <p14:creationId xmlns:p14="http://schemas.microsoft.com/office/powerpoint/2010/main" xmlns="" val="2372570"/>
       </p:ext>
     </p:extLst>
   </p:cSld>
@@ -13586,7 +13553,7 @@
           <a:blip r:embed="rId2">
             <a:extLst>
               <a:ext uri="{28A0092B-C50C-407E-A947-70E740481C1C}">
-                <a14:useLocalDpi xmlns:a14="http://schemas.microsoft.com/office/drawing/2010/main" val="0"/>
+                <a14:useLocalDpi xmlns:a14="http://schemas.microsoft.com/office/drawing/2010/main" xmlns="" val="0"/>
               </a:ext>
             </a:extLst>
           </a:blip>
@@ -13616,7 +13583,7 @@
           <a:blip r:embed="rId3">
             <a:extLst>
               <a:ext uri="{28A0092B-C50C-407E-A947-70E740481C1C}">
-                <a14:useLocalDpi xmlns:a14="http://schemas.microsoft.com/office/drawing/2010/main" val="0"/>
+                <a14:useLocalDpi xmlns:a14="http://schemas.microsoft.com/office/drawing/2010/main" xmlns="" val="0"/>
               </a:ext>
             </a:extLst>
           </a:blip>
@@ -13707,7 +13674,7 @@
     </p:spTree>
     <p:extLst>
       <p:ext uri="{BB962C8B-B14F-4D97-AF65-F5344CB8AC3E}">
-        <p14:creationId xmlns:p14="http://schemas.microsoft.com/office/powerpoint/2010/main" val="3923486495"/>
+        <p14:creationId xmlns:p14="http://schemas.microsoft.com/office/powerpoint/2010/main" xmlns="" val="3923486495"/>
       </p:ext>
     </p:extLst>
   </p:cSld>
@@ -13717,7 +13684,7 @@
   <p:timing>
     <p:tnLst>
       <p:par>
-        <p:cTn xmlns:p14="http://schemas.microsoft.com/office/powerpoint/2010/main" id="1" dur="indefinite" restart="never" nodeType="tmRoot"/>
+        <p:cTn id="1" dur="indefinite" restart="never" nodeType="tmRoot"/>
       </p:par>
     </p:tnLst>
   </p:timing>
@@ -13762,11 +13729,7 @@
             </a:r>
             <a:r>
               <a:rPr lang="en-US" dirty="0" smtClean="0"/>
-              <a:t>an </a:t>
-            </a:r>
-            <a:r>
-              <a:rPr lang="en-US" dirty="0" smtClean="0"/>
-              <a:t>initial mapping </a:t>
+              <a:t>an initial mapping </a:t>
             </a:r>
             <a:r>
               <a:rPr lang="en-US" dirty="0"/>
@@ -13774,11 +13737,7 @@
             </a:r>
             <a:r>
               <a:rPr lang="en-US" dirty="0" smtClean="0"/>
-              <a:t>ontology to </a:t>
-            </a:r>
-            <a:r>
-              <a:rPr lang="en-US" dirty="0" smtClean="0"/>
-              <a:t>OBI</a:t>
+              <a:t>ontology to OBI</a:t>
             </a:r>
             <a:endParaRPr lang="en-US" dirty="0"/>
           </a:p>
@@ -13806,7 +13765,7 @@
     </p:spTree>
     <p:extLst>
       <p:ext uri="{BB962C8B-B14F-4D97-AF65-F5344CB8AC3E}">
-        <p14:creationId xmlns:p14="http://schemas.microsoft.com/office/powerpoint/2010/main" val="331716906"/>
+        <p14:creationId xmlns:p14="http://schemas.microsoft.com/office/powerpoint/2010/main" xmlns="" val="331716906"/>
       </p:ext>
     </p:extLst>
   </p:cSld>
@@ -13817,16 +13776,8 @@
 </file>
 
 <file path=ppt/slides/slide26.xml><?xml version="1.0" encoding="utf-8"?>
-<p:sld xmlns:a="http://schemas.openxmlformats.org/drawingml/2006/main" xmlns:r="http://schemas.openxmlformats.org/officeDocument/2006/relationships" xmlns:p="http://schemas.openxmlformats.org/presentationml/2006/main" showMasterSp="0">
+<p:sld xmlns:a="http://schemas.openxmlformats.org/drawingml/2006/main" xmlns:r="http://schemas.openxmlformats.org/officeDocument/2006/relationships" xmlns:p="http://schemas.openxmlformats.org/presentationml/2006/main">
   <p:cSld>
-    <p:bg>
-      <p:bgPr>
-        <a:solidFill>
-          <a:schemeClr val="bg1"/>
-        </a:solidFill>
-        <a:effectLst/>
-      </p:bgPr>
-    </p:bg>
     <p:spTree>
       <p:nvGrpSpPr>
         <p:cNvPr id="1" name=""/>
@@ -13841,6 +13792,50 @@
           <a:chExt cx="0" cy="0"/>
         </a:xfrm>
       </p:grpSpPr>
+      <p:sp>
+        <p:nvSpPr>
+          <p:cNvPr id="21" name="Rounded Rectangle 20"/>
+          <p:cNvSpPr/>
+          <p:nvPr/>
+        </p:nvSpPr>
+        <p:spPr>
+          <a:xfrm>
+            <a:off x="93468" y="2773241"/>
+            <a:ext cx="4630328" cy="1618955"/>
+          </a:xfrm>
+          <a:prstGeom prst="roundRect">
+            <a:avLst/>
+          </a:prstGeom>
+          <a:solidFill>
+            <a:schemeClr val="accent1">
+              <a:lumMod val="40000"/>
+              <a:lumOff val="60000"/>
+            </a:schemeClr>
+          </a:solidFill>
+        </p:spPr>
+        <p:style>
+          <a:lnRef idx="1">
+            <a:schemeClr val="accent1"/>
+          </a:lnRef>
+          <a:fillRef idx="3">
+            <a:schemeClr val="accent1"/>
+          </a:fillRef>
+          <a:effectRef idx="2">
+            <a:schemeClr val="accent1"/>
+          </a:effectRef>
+          <a:fontRef idx="minor">
+            <a:schemeClr val="lt1"/>
+          </a:fontRef>
+        </p:style>
+        <p:txBody>
+          <a:bodyPr rtlCol="0" anchor="ctr"/>
+          <a:lstStyle/>
+          <a:p>
+            <a:pPr algn="ctr"/>
+            <a:endParaRPr lang="en-US"/>
+          </a:p>
+        </p:txBody>
+      </p:sp>
       <p:pic>
         <p:nvPicPr>
           <p:cNvPr id="4" name="Picture 3"/>
@@ -13856,76 +13851,8 @@
         </p:blipFill>
         <p:spPr>
           <a:xfrm>
-            <a:off x="442726" y="442238"/>
-            <a:ext cx="3626790" cy="2584526"/>
-          </a:xfrm>
-          <a:prstGeom prst="rect">
-            <a:avLst/>
-          </a:prstGeom>
-          <a:ln>
-            <a:noFill/>
-          </a:ln>
-          <a:effectLst>
-            <a:outerShdw blurRad="292100" dist="139700" dir="2700000" algn="tl" rotWithShape="0">
-              <a:srgbClr val="333333">
-                <a:alpha val="65000"/>
-              </a:srgbClr>
-            </a:outerShdw>
-          </a:effectLst>
-        </p:spPr>
-      </p:pic>
-      <p:pic>
-        <p:nvPicPr>
-          <p:cNvPr id="5" name="Picture 4"/>
-          <p:cNvPicPr>
-            <a:picLocks noChangeAspect="1"/>
-          </p:cNvPicPr>
-          <p:nvPr/>
-        </p:nvPicPr>
-        <p:blipFill>
-          <a:blip r:embed="rId3"/>
-          <a:stretch>
-            <a:fillRect/>
-          </a:stretch>
-        </p:blipFill>
-        <p:spPr>
-          <a:xfrm>
-            <a:off x="4733719" y="587056"/>
-            <a:ext cx="4214953" cy="3556103"/>
-          </a:xfrm>
-          <a:prstGeom prst="rect">
-            <a:avLst/>
-          </a:prstGeom>
-          <a:ln>
-            <a:noFill/>
-          </a:ln>
-          <a:effectLst>
-            <a:outerShdw blurRad="292100" dist="139700" dir="2700000" algn="tl" rotWithShape="0">
-              <a:srgbClr val="333333">
-                <a:alpha val="65000"/>
-              </a:srgbClr>
-            </a:outerShdw>
-          </a:effectLst>
-        </p:spPr>
-      </p:pic>
-      <p:pic>
-        <p:nvPicPr>
-          <p:cNvPr id="6" name="Picture 5"/>
-          <p:cNvPicPr>
-            <a:picLocks noChangeAspect="1"/>
-          </p:cNvPicPr>
-          <p:nvPr/>
-        </p:nvPicPr>
-        <p:blipFill>
-          <a:blip r:embed="rId4"/>
-          <a:stretch>
-            <a:fillRect/>
-          </a:stretch>
-        </p:blipFill>
-        <p:spPr>
-          <a:xfrm>
-            <a:off x="94762" y="3249562"/>
-            <a:ext cx="5224363" cy="3497038"/>
+            <a:off x="115750" y="11137"/>
+            <a:ext cx="3657961" cy="2606739"/>
           </a:xfrm>
           <a:prstGeom prst="rect">
             <a:avLst/>
@@ -13949,9 +13876,9 @@
           <p:nvPr/>
         </p:nvCxnSpPr>
         <p:spPr>
-          <a:xfrm>
-            <a:off x="4166745" y="1036011"/>
-            <a:ext cx="566974" cy="0"/>
+          <a:xfrm flipV="1">
+            <a:off x="4091840" y="1771244"/>
+            <a:ext cx="464841" cy="1"/>
           </a:xfrm>
           <a:prstGeom prst="straightConnector1">
             <a:avLst/>
@@ -13975,6 +13902,149 @@
           </a:fontRef>
         </p:style>
       </p:cxnSp>
+      <p:pic>
+        <p:nvPicPr>
+          <p:cNvPr id="15" name="Picture 14"/>
+          <p:cNvPicPr>
+            <a:picLocks noChangeAspect="1"/>
+          </p:cNvPicPr>
+          <p:nvPr/>
+        </p:nvPicPr>
+        <p:blipFill>
+          <a:blip r:embed="rId3"/>
+          <a:stretch>
+            <a:fillRect/>
+          </a:stretch>
+        </p:blipFill>
+        <p:spPr>
+          <a:xfrm>
+            <a:off x="104609" y="4603856"/>
+            <a:ext cx="6256919" cy="2150062"/>
+          </a:xfrm>
+          <a:prstGeom prst="rect">
+            <a:avLst/>
+          </a:prstGeom>
+          <a:ln>
+            <a:noFill/>
+          </a:ln>
+          <a:effectLst>
+            <a:outerShdw blurRad="292100" dist="139700" dir="2700000" algn="tl" rotWithShape="0">
+              <a:srgbClr val="333333">
+                <a:alpha val="65000"/>
+              </a:srgbClr>
+            </a:outerShdw>
+          </a:effectLst>
+        </p:spPr>
+      </p:pic>
+      <p:pic>
+        <p:nvPicPr>
+          <p:cNvPr id="16" name="Picture 15"/>
+          <p:cNvPicPr>
+            <a:picLocks noChangeAspect="1"/>
+          </p:cNvPicPr>
+          <p:nvPr/>
+        </p:nvPicPr>
+        <p:blipFill rotWithShape="1">
+          <a:blip r:embed="rId4"/>
+          <a:srcRect l="4280" r="1915"/>
+          <a:stretch/>
+        </p:blipFill>
+        <p:spPr>
+          <a:xfrm>
+            <a:off x="4812925" y="18335"/>
+            <a:ext cx="4189027" cy="5821304"/>
+          </a:xfrm>
+          <a:prstGeom prst="rect">
+            <a:avLst/>
+          </a:prstGeom>
+          <a:ln>
+            <a:noFill/>
+          </a:ln>
+          <a:effectLst>
+            <a:outerShdw blurRad="292100" dist="139700" dir="2700000" algn="tl" rotWithShape="0">
+              <a:srgbClr val="333333">
+                <a:alpha val="65000"/>
+              </a:srgbClr>
+            </a:outerShdw>
+          </a:effectLst>
+        </p:spPr>
+      </p:pic>
+      <p:sp>
+        <p:nvSpPr>
+          <p:cNvPr id="17" name="Rectangle 16"/>
+          <p:cNvSpPr/>
+          <p:nvPr/>
+        </p:nvSpPr>
+        <p:spPr>
+          <a:xfrm>
+            <a:off x="104609" y="2851221"/>
+            <a:ext cx="4708316" cy="1477328"/>
+          </a:xfrm>
+          <a:prstGeom prst="rect">
+            <a:avLst/>
+          </a:prstGeom>
+        </p:spPr>
+        <p:txBody>
+          <a:bodyPr wrap="square">
+            <a:spAutoFit/>
+          </a:bodyPr>
+          <a:lstStyle/>
+          <a:p>
+            <a:pPr marL="0" lvl="1"/>
+            <a:r>
+              <a:rPr lang="en-US" b="1" dirty="0" err="1" smtClean="0"/>
+              <a:t>intersection_of</a:t>
+            </a:r>
+            <a:r>
+              <a:rPr lang="en-US" b="1" dirty="0"/>
+              <a:t>: ECO:0000226 ! </a:t>
+            </a:r>
+            <a:endParaRPr lang="en-US" b="1" dirty="0" smtClean="0"/>
+          </a:p>
+          <a:p>
+            <a:pPr marL="0" lvl="1"/>
+            <a:r>
+              <a:rPr lang="en-US" b="1" dirty="0" smtClean="0"/>
+              <a:t>chromatin </a:t>
+            </a:r>
+            <a:r>
+              <a:rPr lang="en-US" b="1" dirty="0" err="1"/>
+              <a:t>immunoprecipitation</a:t>
+            </a:r>
+            <a:r>
+              <a:rPr lang="en-US" b="1" dirty="0"/>
+              <a:t> </a:t>
+            </a:r>
+            <a:r>
+              <a:rPr lang="en-US" b="1" dirty="0" smtClean="0"/>
+              <a:t>experiment</a:t>
+            </a:r>
+          </a:p>
+          <a:p>
+            <a:pPr marL="0" lvl="1"/>
+            <a:endParaRPr lang="en-US" b="1" dirty="0"/>
+          </a:p>
+          <a:p>
+            <a:pPr marL="0" lvl="1"/>
+            <a:r>
+              <a:rPr lang="en-US" b="1" dirty="0" err="1"/>
+              <a:t>intersection_of</a:t>
+            </a:r>
+            <a:r>
+              <a:rPr lang="en-US" b="1" dirty="0"/>
+              <a:t>: OBI:0000312 OBI:0000716 ! </a:t>
+            </a:r>
+            <a:r>
+              <a:rPr lang="en-US" b="1" dirty="0" err="1"/>
+              <a:t>ChIP-seq</a:t>
+            </a:r>
+            <a:r>
+              <a:rPr lang="en-US" b="1" dirty="0"/>
+              <a:t> assay</a:t>
+            </a:r>
+          </a:p>
+        </p:txBody>
+      </p:sp>
       <p:cxnSp>
         <p:nvCxnSpPr>
           <p:cNvPr id="11" name="Straight Arrow Connector 10"/>
@@ -13983,8 +14053,8 @@
         </p:nvCxnSpPr>
         <p:spPr>
           <a:xfrm flipH="1">
-            <a:off x="5737630" y="4407842"/>
-            <a:ext cx="965696" cy="326615"/>
+            <a:off x="4935476" y="5493512"/>
+            <a:ext cx="401718" cy="0"/>
           </a:xfrm>
           <a:prstGeom prst="straightConnector1">
             <a:avLst/>
@@ -14008,10 +14078,168 @@
           </a:fontRef>
         </p:style>
       </p:cxnSp>
+      <p:sp>
+        <p:nvSpPr>
+          <p:cNvPr id="23" name="Up Arrow 22"/>
+          <p:cNvSpPr/>
+          <p:nvPr/>
+        </p:nvSpPr>
+        <p:spPr>
+          <a:xfrm>
+            <a:off x="2451027" y="4272849"/>
+            <a:ext cx="256243" cy="386707"/>
+          </a:xfrm>
+          <a:prstGeom prst="upArrow">
+            <a:avLst/>
+          </a:prstGeom>
+        </p:spPr>
+        <p:style>
+          <a:lnRef idx="1">
+            <a:schemeClr val="accent1"/>
+          </a:lnRef>
+          <a:fillRef idx="3">
+            <a:schemeClr val="accent1"/>
+          </a:fillRef>
+          <a:effectRef idx="2">
+            <a:schemeClr val="accent1"/>
+          </a:effectRef>
+          <a:fontRef idx="minor">
+            <a:schemeClr val="lt1"/>
+          </a:fontRef>
+        </p:style>
+        <p:txBody>
+          <a:bodyPr rtlCol="0" anchor="ctr"/>
+          <a:lstStyle/>
+          <a:p>
+            <a:pPr algn="ctr"/>
+            <a:endParaRPr lang="en-US"/>
+          </a:p>
+        </p:txBody>
+      </p:sp>
+      <p:sp>
+        <p:nvSpPr>
+          <p:cNvPr id="24" name="Rectangle 23"/>
+          <p:cNvSpPr/>
+          <p:nvPr/>
+        </p:nvSpPr>
+        <p:spPr>
+          <a:xfrm>
+            <a:off x="5041956" y="3445303"/>
+            <a:ext cx="1319571" cy="646331"/>
+          </a:xfrm>
+          <a:prstGeom prst="rect">
+            <a:avLst/>
+          </a:prstGeom>
+          <a:solidFill>
+            <a:schemeClr val="bg1">
+              <a:lumMod val="75000"/>
+            </a:schemeClr>
+          </a:solidFill>
+        </p:spPr>
+        <p:txBody>
+          <a:bodyPr wrap="square">
+            <a:spAutoFit/>
+          </a:bodyPr>
+          <a:lstStyle/>
+          <a:p>
+            <a:r>
+              <a:rPr lang="en-US" b="1" i="1" dirty="0" err="1" smtClean="0"/>
+              <a:t>is_specified_output_of</a:t>
+            </a:r>
+            <a:endParaRPr lang="en-US" b="1" i="1" dirty="0"/>
+          </a:p>
+        </p:txBody>
+      </p:sp>
+      <p:cxnSp>
+        <p:nvCxnSpPr>
+          <p:cNvPr id="12" name="Straight Arrow Connector 11"/>
+          <p:cNvCxnSpPr/>
+          <p:nvPr/>
+        </p:nvCxnSpPr>
+        <p:spPr>
+          <a:xfrm flipH="1" flipV="1">
+            <a:off x="7703574" y="5460104"/>
+            <a:ext cx="232134" cy="278049"/>
+          </a:xfrm>
+          <a:prstGeom prst="straightConnector1">
+            <a:avLst/>
+          </a:prstGeom>
+          <a:ln>
+            <a:tailEnd type="arrow"/>
+          </a:ln>
+        </p:spPr>
+        <p:style>
+          <a:lnRef idx="2">
+            <a:schemeClr val="accent1"/>
+          </a:lnRef>
+          <a:fillRef idx="0">
+            <a:schemeClr val="accent1"/>
+          </a:fillRef>
+          <a:effectRef idx="1">
+            <a:schemeClr val="accent1"/>
+          </a:effectRef>
+          <a:fontRef idx="minor">
+            <a:schemeClr val="tx1"/>
+          </a:fontRef>
+        </p:style>
+      </p:cxnSp>
+      <p:sp>
+        <p:nvSpPr>
+          <p:cNvPr id="3" name="Rectangle 2"/>
+          <p:cNvSpPr/>
+          <p:nvPr/>
+        </p:nvSpPr>
+        <p:spPr>
+          <a:xfrm>
+            <a:off x="6545976" y="5862746"/>
+            <a:ext cx="2416584" cy="923330"/>
+          </a:xfrm>
+          <a:prstGeom prst="rect">
+            <a:avLst/>
+          </a:prstGeom>
+        </p:spPr>
+        <p:txBody>
+          <a:bodyPr wrap="square">
+            <a:spAutoFit/>
+          </a:bodyPr>
+          <a:lstStyle/>
+          <a:p>
+            <a:pPr algn="r"/>
+            <a:r>
+              <a:rPr lang="en-US" b="1" dirty="0" smtClean="0"/>
+              <a:t>rename to  </a:t>
+            </a:r>
+            <a:r>
+              <a:rPr lang="en-US" b="1" i="1" dirty="0" smtClean="0"/>
+              <a:t>chromatin</a:t>
+            </a:r>
+          </a:p>
+          <a:p>
+            <a:pPr algn="r"/>
+            <a:r>
+              <a:rPr lang="en-US" b="1" i="1" dirty="0" smtClean="0"/>
+              <a:t> </a:t>
+            </a:r>
+            <a:r>
+              <a:rPr lang="en-US" b="1" i="1" dirty="0" err="1" smtClean="0"/>
+              <a:t>immunoprecipitation-seq</a:t>
+            </a:r>
+            <a:r>
+              <a:rPr lang="en-US" b="1" i="1" dirty="0"/>
+              <a:t> </a:t>
+            </a:r>
+            <a:r>
+              <a:rPr lang="en-US" b="1" i="1" dirty="0" smtClean="0"/>
+              <a:t>evidence</a:t>
+            </a:r>
+            <a:endParaRPr lang="en-US" b="1" dirty="0"/>
+          </a:p>
+        </p:txBody>
+      </p:sp>
     </p:spTree>
     <p:extLst>
       <p:ext uri="{BB962C8B-B14F-4D97-AF65-F5344CB8AC3E}">
-        <p14:creationId xmlns:p14="http://schemas.microsoft.com/office/powerpoint/2010/main" val="3918255370"/>
+        <p14:creationId xmlns:p14="http://schemas.microsoft.com/office/powerpoint/2010/main" xmlns="" val="208833400"/>
       </p:ext>
     </p:extLst>
   </p:cSld>
@@ -14145,7 +14373,7 @@
     </p:spTree>
     <p:extLst>
       <p:ext uri="{BB962C8B-B14F-4D97-AF65-F5344CB8AC3E}">
-        <p14:creationId xmlns:p14="http://schemas.microsoft.com/office/powerpoint/2010/main" val="3279604152"/>
+        <p14:creationId xmlns:p14="http://schemas.microsoft.com/office/powerpoint/2010/main" xmlns="" val="3279604152"/>
       </p:ext>
     </p:extLst>
   </p:cSld>
@@ -14271,7 +14499,7 @@
     </p:spTree>
     <p:extLst>
       <p:ext uri="{BB962C8B-B14F-4D97-AF65-F5344CB8AC3E}">
-        <p14:creationId xmlns:p14="http://schemas.microsoft.com/office/powerpoint/2010/main" val="2205250437"/>
+        <p14:creationId xmlns:p14="http://schemas.microsoft.com/office/powerpoint/2010/main" xmlns="" val="2205250437"/>
       </p:ext>
     </p:extLst>
   </p:cSld>
@@ -14762,7 +14990,7 @@
     </p:spTree>
     <p:extLst>
       <p:ext uri="{BB962C8B-B14F-4D97-AF65-F5344CB8AC3E}">
-        <p14:creationId xmlns:p14="http://schemas.microsoft.com/office/powerpoint/2010/main" val="1871814094"/>
+        <p14:creationId xmlns:p14="http://schemas.microsoft.com/office/powerpoint/2010/main" xmlns="" val="1871814094"/>
       </p:ext>
     </p:extLst>
   </p:cSld>
@@ -15604,7 +15832,7 @@
     </p:spTree>
     <p:extLst>
       <p:ext uri="{BB962C8B-B14F-4D97-AF65-F5344CB8AC3E}">
-        <p14:creationId xmlns:p14="http://schemas.microsoft.com/office/powerpoint/2010/main" val="3772283126"/>
+        <p14:creationId xmlns:p14="http://schemas.microsoft.com/office/powerpoint/2010/main" xmlns="" val="3772283126"/>
       </p:ext>
     </p:extLst>
   </p:cSld>
@@ -15614,7 +15842,7 @@
   <p:timing>
     <p:tnLst>
       <p:par>
-        <p:cTn xmlns:p14="http://schemas.microsoft.com/office/powerpoint/2010/main" id="1" dur="indefinite" restart="never" nodeType="tmRoot"/>
+        <p:cTn id="1" dur="indefinite" restart="never" nodeType="tmRoot"/>
       </p:par>
     </p:tnLst>
   </p:timing>
@@ -15660,7 +15888,7 @@
           <a:blip r:embed="rId2">
             <a:extLst>
               <a:ext uri="{28A0092B-C50C-407E-A947-70E740481C1C}">
-                <a14:useLocalDpi xmlns:a14="http://schemas.microsoft.com/office/drawing/2010/main" val="0"/>
+                <a14:useLocalDpi xmlns:a14="http://schemas.microsoft.com/office/drawing/2010/main" xmlns="" val="0"/>
               </a:ext>
             </a:extLst>
           </a:blip>
@@ -16233,7 +16461,7 @@
     </p:spTree>
     <p:extLst>
       <p:ext uri="{BB962C8B-B14F-4D97-AF65-F5344CB8AC3E}">
-        <p14:creationId xmlns:p14="http://schemas.microsoft.com/office/powerpoint/2010/main" val="3788758449"/>
+        <p14:creationId xmlns:p14="http://schemas.microsoft.com/office/powerpoint/2010/main" xmlns="" val="3788758449"/>
       </p:ext>
     </p:extLst>
   </p:cSld>
@@ -16277,15 +16505,7 @@
           <a:p>
             <a:r>
               <a:rPr lang="en-US" dirty="0" smtClean="0"/>
-              <a:t>Who </a:t>
-            </a:r>
-            <a:r>
-              <a:rPr lang="en-US" dirty="0" smtClean="0"/>
-              <a:t>uses </a:t>
-            </a:r>
-            <a:r>
-              <a:rPr lang="en-US" dirty="0" smtClean="0"/>
-              <a:t>ECO?</a:t>
+              <a:t>Who uses ECO?</a:t>
             </a:r>
             <a:endParaRPr lang="en-US" dirty="0"/>
           </a:p>
@@ -16614,11 +16834,7 @@
             <a:pPr lvl="1"/>
             <a:r>
               <a:rPr lang="en-US" dirty="0" smtClean="0"/>
-              <a:t>Hymenoptera Anatomy </a:t>
-            </a:r>
-            <a:r>
-              <a:rPr lang="en-US" dirty="0" smtClean="0"/>
-              <a:t>Ontology</a:t>
+              <a:t>Hymenoptera Anatomy Ontology</a:t>
             </a:r>
           </a:p>
           <a:p>
@@ -16634,7 +16850,7 @@
     </p:spTree>
     <p:extLst>
       <p:ext uri="{BB962C8B-B14F-4D97-AF65-F5344CB8AC3E}">
-        <p14:creationId xmlns:p14="http://schemas.microsoft.com/office/powerpoint/2010/main" val="3366523913"/>
+        <p14:creationId xmlns:p14="http://schemas.microsoft.com/office/powerpoint/2010/main" xmlns="" val="3366523913"/>
       </p:ext>
     </p:extLst>
   </p:cSld>
@@ -16710,7 +16926,7 @@
     </p:spTree>
     <p:extLst>
       <p:ext uri="{BB962C8B-B14F-4D97-AF65-F5344CB8AC3E}">
-        <p14:creationId xmlns:p14="http://schemas.microsoft.com/office/powerpoint/2010/main" val="2277903806"/>
+        <p14:creationId xmlns:p14="http://schemas.microsoft.com/office/powerpoint/2010/main" xmlns="" val="2277903806"/>
       </p:ext>
     </p:extLst>
   </p:cSld>
@@ -16900,7 +17116,7 @@
     </p:spTree>
     <p:extLst>
       <p:ext uri="{BB962C8B-B14F-4D97-AF65-F5344CB8AC3E}">
-        <p14:creationId xmlns:p14="http://schemas.microsoft.com/office/powerpoint/2010/main" val="1762399074"/>
+        <p14:creationId xmlns:p14="http://schemas.microsoft.com/office/powerpoint/2010/main" xmlns="" val="1762399074"/>
       </p:ext>
     </p:extLst>
   </p:cSld>
@@ -17176,7 +17392,7 @@
     </p:spTree>
     <p:extLst>
       <p:ext uri="{BB962C8B-B14F-4D97-AF65-F5344CB8AC3E}">
-        <p14:creationId xmlns:p14="http://schemas.microsoft.com/office/powerpoint/2010/main" val="2554175214"/>
+        <p14:creationId xmlns:p14="http://schemas.microsoft.com/office/powerpoint/2010/main" xmlns="" val="2554175214"/>
       </p:ext>
     </p:extLst>
   </p:cSld>
@@ -17252,31 +17468,19 @@
           <a:p>
             <a:r>
               <a:rPr lang="en-US" dirty="0" smtClean="0"/>
-              <a:t>Participate in OBI </a:t>
-            </a:r>
+              <a:t>Participate in OBI developer calls</a:t>
+            </a:r>
+          </a:p>
+          <a:p>
+            <a:endParaRPr lang="en-US" dirty="0"/>
+          </a:p>
+          <a:p>
+            <a:endParaRPr lang="en-US" dirty="0" smtClean="0"/>
+          </a:p>
+          <a:p>
             <a:r>
               <a:rPr lang="en-US" dirty="0" smtClean="0"/>
-              <a:t>developer calls</a:t>
-            </a:r>
-          </a:p>
-          <a:p>
-            <a:endParaRPr lang="en-US" dirty="0"/>
-          </a:p>
-          <a:p>
-            <a:endParaRPr lang="en-US" dirty="0" smtClean="0"/>
-          </a:p>
-          <a:p>
-            <a:r>
-              <a:rPr lang="en-US" dirty="0" smtClean="0"/>
-              <a:t>Attend an </a:t>
-            </a:r>
-            <a:r>
-              <a:rPr lang="en-US" dirty="0" smtClean="0"/>
-              <a:t>OBI </a:t>
-            </a:r>
-            <a:r>
-              <a:rPr lang="en-US" dirty="0" smtClean="0"/>
-              <a:t>meeting</a:t>
+              <a:t>Attend an OBI meeting</a:t>
             </a:r>
           </a:p>
           <a:p>
@@ -17290,15 +17494,7 @@
             <a:pPr lvl="1"/>
             <a:r>
               <a:rPr lang="en-US" dirty="0" smtClean="0"/>
-              <a:t>Upcoming meeting </a:t>
-            </a:r>
-            <a:r>
-              <a:rPr lang="en-US" dirty="0" smtClean="0"/>
-              <a:t>place </a:t>
-            </a:r>
-            <a:r>
-              <a:rPr lang="en-US" dirty="0" smtClean="0"/>
-              <a:t>TBA, time TBA (Oct/Nov?)</a:t>
+              <a:t>Upcoming meeting place TBA, time TBA (Oct/Nov?)</a:t>
             </a:r>
           </a:p>
           <a:p>
@@ -17306,7 +17502,6 @@
               <a:rPr lang="en-US" dirty="0" smtClean="0"/>
               <a:t>Participate in the OBI developers mail list</a:t>
             </a:r>
-            <a:endParaRPr lang="en-US" dirty="0" smtClean="0"/>
           </a:p>
           <a:p>
             <a:endParaRPr lang="en-US" dirty="0"/>
@@ -17384,7 +17579,7 @@
     </p:spTree>
     <p:extLst>
       <p:ext uri="{BB962C8B-B14F-4D97-AF65-F5344CB8AC3E}">
-        <p14:creationId xmlns:p14="http://schemas.microsoft.com/office/powerpoint/2010/main" val="4022831994"/>
+        <p14:creationId xmlns:p14="http://schemas.microsoft.com/office/powerpoint/2010/main" xmlns="" val="4022831994"/>
       </p:ext>
     </p:extLst>
   </p:cSld>

</xml_diff>